<commit_message>
update default paragraph spacing
</commit_message>
<xml_diff>
--- a/output/demo_deck.pptx
+++ b/output/demo_deck.pptx
@@ -20472,7 +20472,7 @@
           <a:p>
             <a:r>
               <a:rPr/>
-              <a:t>Generated on 2026-02-12</a:t>
+              <a:t>Generated on 2026-02-13</a:t>
             </a:r>
           </a:p>
         </p:txBody>
@@ -20575,21 +20575,42 @@
           <a:bodyPr/>
           <a:lstStyle/>
           <a:p>
-            <a:pPr/>
+            <a:pPr lvl="1">
+              <a:spcBef>
+                <a:spcPts val="300"/>
+              </a:spcBef>
+              <a:spcAft>
+                <a:spcPts val="300"/>
+              </a:spcAft>
+            </a:pPr>
             <a:r>
               <a:rPr/>
               <a:t>Data is randomly generated for demonstration.</a:t>
             </a:r>
           </a:p>
           <a:p>
-            <a:pPr/>
+            <a:pPr lvl="1">
+              <a:spcBef>
+                <a:spcPts val="300"/>
+              </a:spcBef>
+              <a:spcAft>
+                <a:spcPts val="300"/>
+              </a:spcAft>
+            </a:pPr>
             <a:r>
               <a:rPr/>
               <a:t>Points are grouped into 3 categories.</a:t>
             </a:r>
           </a:p>
           <a:p>
-            <a:pPr/>
+            <a:pPr lvl="1">
+              <a:spcBef>
+                <a:spcPts val="300"/>
+              </a:spcBef>
+              <a:spcAft>
+                <a:spcPts val="300"/>
+              </a:spcAft>
+            </a:pPr>
             <a:r>
               <a:rPr/>
               <a:t>Template placeholders control chart/text placement.</a:t>

</xml_diff>